<commit_message>
Update Design and Milestones
</commit_message>
<xml_diff>
--- a/SAVI - Design Camp 2015.pptx
+++ b/SAVI - Design Camp 2015.pptx
@@ -10,8 +10,14 @@
     <p:sldId id="261" r:id="rId4"/>
     <p:sldId id="262" r:id="rId5"/>
     <p:sldId id="259" r:id="rId6"/>
-    <p:sldId id="258" r:id="rId7"/>
-    <p:sldId id="260" r:id="rId8"/>
+    <p:sldId id="265" r:id="rId7"/>
+    <p:sldId id="263" r:id="rId8"/>
+    <p:sldId id="264" r:id="rId9"/>
+    <p:sldId id="267" r:id="rId10"/>
+    <p:sldId id="270" r:id="rId11"/>
+    <p:sldId id="266" r:id="rId12"/>
+    <p:sldId id="268" r:id="rId13"/>
+    <p:sldId id="269" r:id="rId14"/>
   </p:sldIdLst>
   <p:sldSz cx="12192000" cy="6858000"/>
   <p:notesSz cx="6858000" cy="9144000"/>
@@ -110,6 +116,11 @@
       </a:defRPr>
     </a:lvl9pPr>
   </p:defaultTextStyle>
+  <p:extLst>
+    <p:ext uri="{EFAFB233-063F-42B5-8137-9DF3F51BA10A}">
+      <p15:sldGuideLst xmlns:p15="http://schemas.microsoft.com/office/powerpoint/2012/main"/>
+    </p:ext>
+  </p:extLst>
 </p:presentation>
 </file>
 
@@ -3906,6 +3917,1049 @@
 </p:sld>
 </file>
 
+<file path=ppt/slides/slide10.xml><?xml version="1.0" encoding="utf-8"?>
+<p:sld xmlns:a="http://schemas.openxmlformats.org/drawingml/2006/main" xmlns:r="http://schemas.openxmlformats.org/officeDocument/2006/relationships" xmlns:p="http://schemas.openxmlformats.org/presentationml/2006/main">
+  <p:cSld>
+    <p:spTree>
+      <p:nvGrpSpPr>
+        <p:cNvPr id="1" name=""/>
+        <p:cNvGrpSpPr/>
+        <p:nvPr/>
+      </p:nvGrpSpPr>
+      <p:grpSpPr>
+        <a:xfrm>
+          <a:off x="0" y="0"/>
+          <a:ext cx="0" cy="0"/>
+          <a:chOff x="0" y="0"/>
+          <a:chExt cx="0" cy="0"/>
+        </a:xfrm>
+      </p:grpSpPr>
+      <p:sp>
+        <p:nvSpPr>
+          <p:cNvPr id="2" name="Title 1"/>
+          <p:cNvSpPr>
+            <a:spLocks noGrp="1"/>
+          </p:cNvSpPr>
+          <p:nvPr>
+            <p:ph type="title"/>
+          </p:nvPr>
+        </p:nvSpPr>
+        <p:spPr/>
+        <p:txBody>
+          <a:bodyPr/>
+          <a:lstStyle/>
+          <a:p>
+            <a:r>
+              <a:rPr lang="en-CA" dirty="0"/>
+              <a:t>Design</a:t>
+            </a:r>
+          </a:p>
+        </p:txBody>
+      </p:sp>
+      <p:sp>
+        <p:nvSpPr>
+          <p:cNvPr id="3" name="Content Placeholder 2"/>
+          <p:cNvSpPr>
+            <a:spLocks noGrp="1"/>
+          </p:cNvSpPr>
+          <p:nvPr>
+            <p:ph idx="1"/>
+          </p:nvPr>
+        </p:nvSpPr>
+        <p:spPr/>
+        <p:txBody>
+          <a:bodyPr/>
+          <a:lstStyle/>
+          <a:p>
+            <a:pPr marL="0" indent="0">
+              <a:buNone/>
+            </a:pPr>
+            <a:r>
+              <a:rPr lang="en-CA" b="1" dirty="0" smtClean="0"/>
+              <a:t>Public transportation cost:</a:t>
+            </a:r>
+          </a:p>
+          <a:p>
+            <a:pPr marL="0" indent="0">
+              <a:buNone/>
+            </a:pPr>
+            <a:r>
+              <a:rPr lang="en-CA" dirty="0" smtClean="0"/>
+              <a:t>C_PUB(</a:t>
+            </a:r>
+            <a:r>
+              <a:rPr lang="en-CA" dirty="0" err="1" smtClean="0"/>
+              <a:t>S,D,t</a:t>
+            </a:r>
+            <a:r>
+              <a:rPr lang="en-CA" dirty="0"/>
+              <a:t>) = </a:t>
+            </a:r>
+            <a:r>
+              <a:rPr lang="en-CA" dirty="0" smtClean="0"/>
+              <a:t>G_PUB(S,S1,t)</a:t>
+            </a:r>
+            <a:endParaRPr lang="en-CA" b="1" dirty="0" smtClean="0"/>
+          </a:p>
+          <a:p>
+            <a:pPr marL="0" indent="0">
+              <a:buNone/>
+            </a:pPr>
+            <a:r>
+              <a:rPr lang="en-CA" b="1" dirty="0" smtClean="0"/>
+              <a:t>BIXI </a:t>
+            </a:r>
+            <a:r>
+              <a:rPr lang="en-CA" b="1" dirty="0"/>
+              <a:t>cost:</a:t>
+            </a:r>
+          </a:p>
+          <a:p>
+            <a:pPr marL="0" indent="0">
+              <a:buNone/>
+            </a:pPr>
+            <a:r>
+              <a:rPr lang="en-CA" dirty="0"/>
+              <a:t>C_BIXI(</a:t>
+            </a:r>
+            <a:r>
+              <a:rPr lang="en-CA" dirty="0" err="1"/>
+              <a:t>S,D,t</a:t>
+            </a:r>
+            <a:r>
+              <a:rPr lang="en-CA" dirty="0"/>
+              <a:t>) = </a:t>
+            </a:r>
+            <a:r>
+              <a:rPr lang="en-CA" dirty="0" err="1" smtClean="0"/>
+              <a:t>G_w</a:t>
+            </a:r>
+            <a:r>
+              <a:rPr lang="en-CA" dirty="0" smtClean="0"/>
+              <a:t>(S,S1,t) </a:t>
+            </a:r>
+            <a:r>
+              <a:rPr lang="en-CA" dirty="0"/>
+              <a:t>+ </a:t>
+            </a:r>
+            <a:r>
+              <a:rPr lang="en-CA" dirty="0" err="1" smtClean="0"/>
+              <a:t>G_b</a:t>
+            </a:r>
+            <a:r>
+              <a:rPr lang="en-CA" dirty="0" smtClean="0"/>
+              <a:t>(S1,D1,t) </a:t>
+            </a:r>
+            <a:r>
+              <a:rPr lang="en-CA" dirty="0"/>
+              <a:t>+ </a:t>
+            </a:r>
+            <a:r>
+              <a:rPr lang="en-CA" dirty="0" err="1" smtClean="0"/>
+              <a:t>G_w</a:t>
+            </a:r>
+            <a:r>
+              <a:rPr lang="en-CA" dirty="0" smtClean="0"/>
+              <a:t>(D1,D,t)</a:t>
+            </a:r>
+          </a:p>
+          <a:p>
+            <a:pPr marL="0" indent="0">
+              <a:buNone/>
+            </a:pPr>
+            <a:r>
+              <a:rPr lang="en-CA" i="1" dirty="0" smtClean="0"/>
+              <a:t>These 2 costs could be adjusted by other information from CVST</a:t>
+            </a:r>
+          </a:p>
+          <a:p>
+            <a:pPr>
+              <a:buFont typeface="Arial" panose="020B0604020202020204" pitchFamily="34" charset="0"/>
+              <a:buChar char="•"/>
+            </a:pPr>
+            <a:r>
+              <a:rPr lang="en-CA" i="1" dirty="0"/>
+              <a:t> </a:t>
+            </a:r>
+            <a:r>
+              <a:rPr lang="en-CA" i="1" dirty="0" smtClean="0"/>
+              <a:t>Road blocks</a:t>
+            </a:r>
+          </a:p>
+          <a:p>
+            <a:pPr>
+              <a:buFont typeface="Arial" panose="020B0604020202020204" pitchFamily="34" charset="0"/>
+              <a:buChar char="•"/>
+            </a:pPr>
+            <a:r>
+              <a:rPr lang="en-CA" i="1" dirty="0"/>
+              <a:t> </a:t>
+            </a:r>
+            <a:r>
+              <a:rPr lang="en-CA" i="1" dirty="0" smtClean="0"/>
+              <a:t>Constructions</a:t>
+            </a:r>
+          </a:p>
+          <a:p>
+            <a:pPr>
+              <a:buFont typeface="Arial" panose="020B0604020202020204" pitchFamily="34" charset="0"/>
+              <a:buChar char="•"/>
+            </a:pPr>
+            <a:r>
+              <a:rPr lang="en-CA" i="1" dirty="0"/>
+              <a:t> </a:t>
+            </a:r>
+            <a:r>
+              <a:rPr lang="en-CA" i="1" dirty="0" smtClean="0"/>
+              <a:t>Accidents</a:t>
+            </a:r>
+          </a:p>
+          <a:p>
+            <a:pPr>
+              <a:buFont typeface="Arial" panose="020B0604020202020204" pitchFamily="34" charset="0"/>
+              <a:buChar char="•"/>
+            </a:pPr>
+            <a:r>
+              <a:rPr lang="en-CA" i="1" dirty="0"/>
+              <a:t> </a:t>
+            </a:r>
+            <a:r>
+              <a:rPr lang="en-CA" i="1" dirty="0" smtClean="0"/>
+              <a:t>…</a:t>
+            </a:r>
+          </a:p>
+          <a:p>
+            <a:pPr marL="0" indent="0">
+              <a:buNone/>
+            </a:pPr>
+            <a:endParaRPr lang="en-CA" dirty="0"/>
+          </a:p>
+          <a:p>
+            <a:pPr marL="0" indent="0">
+              <a:buNone/>
+            </a:pPr>
+            <a:endParaRPr lang="en-CA" dirty="0"/>
+          </a:p>
+          <a:p>
+            <a:endParaRPr lang="en-CA" dirty="0"/>
+          </a:p>
+        </p:txBody>
+      </p:sp>
+    </p:spTree>
+    <p:extLst>
+      <p:ext uri="{BB962C8B-B14F-4D97-AF65-F5344CB8AC3E}">
+        <p14:creationId xmlns:p14="http://schemas.microsoft.com/office/powerpoint/2010/main" val="51058796"/>
+      </p:ext>
+    </p:extLst>
+  </p:cSld>
+  <p:clrMapOvr>
+    <a:masterClrMapping/>
+  </p:clrMapOvr>
+  <p:timing>
+    <p:tnLst>
+      <p:par>
+        <p:cTn id="1" dur="indefinite" restart="never" nodeType="tmRoot"/>
+      </p:par>
+    </p:tnLst>
+  </p:timing>
+</p:sld>
+</file>
+
+<file path=ppt/slides/slide11.xml><?xml version="1.0" encoding="utf-8"?>
+<p:sld xmlns:a="http://schemas.openxmlformats.org/drawingml/2006/main" xmlns:r="http://schemas.openxmlformats.org/officeDocument/2006/relationships" xmlns:p="http://schemas.openxmlformats.org/presentationml/2006/main">
+  <p:cSld>
+    <p:spTree>
+      <p:nvGrpSpPr>
+        <p:cNvPr id="1" name=""/>
+        <p:cNvGrpSpPr/>
+        <p:nvPr/>
+      </p:nvGrpSpPr>
+      <p:grpSpPr>
+        <a:xfrm>
+          <a:off x="0" y="0"/>
+          <a:ext cx="0" cy="0"/>
+          <a:chOff x="0" y="0"/>
+          <a:chExt cx="0" cy="0"/>
+        </a:xfrm>
+      </p:grpSpPr>
+      <p:sp>
+        <p:nvSpPr>
+          <p:cNvPr id="2" name="Title 1"/>
+          <p:cNvSpPr>
+            <a:spLocks noGrp="1"/>
+          </p:cNvSpPr>
+          <p:nvPr>
+            <p:ph type="title"/>
+          </p:nvPr>
+        </p:nvSpPr>
+        <p:spPr/>
+        <p:txBody>
+          <a:bodyPr/>
+          <a:lstStyle/>
+          <a:p>
+            <a:r>
+              <a:rPr lang="en-CA" dirty="0"/>
+              <a:t>Design</a:t>
+            </a:r>
+          </a:p>
+        </p:txBody>
+      </p:sp>
+      <p:sp>
+        <p:nvSpPr>
+          <p:cNvPr id="3" name="Content Placeholder 2"/>
+          <p:cNvSpPr>
+            <a:spLocks noGrp="1"/>
+          </p:cNvSpPr>
+          <p:nvPr>
+            <p:ph idx="1"/>
+          </p:nvPr>
+        </p:nvSpPr>
+        <p:spPr/>
+        <p:txBody>
+          <a:bodyPr/>
+          <a:lstStyle/>
+          <a:p>
+            <a:pPr marL="0" indent="0">
+              <a:buNone/>
+            </a:pPr>
+            <a:r>
+              <a:rPr lang="en-CA" b="1" dirty="0" smtClean="0"/>
+              <a:t>BIXI </a:t>
+            </a:r>
+            <a:r>
+              <a:rPr lang="en-CA" b="1" dirty="0"/>
+              <a:t>cost:</a:t>
+            </a:r>
+          </a:p>
+          <a:p>
+            <a:pPr marL="0" indent="0">
+              <a:buNone/>
+            </a:pPr>
+            <a:r>
+              <a:rPr lang="en-CA" dirty="0"/>
+              <a:t>C_BIXI(</a:t>
+            </a:r>
+            <a:r>
+              <a:rPr lang="en-CA" dirty="0" err="1"/>
+              <a:t>S,D,t</a:t>
+            </a:r>
+            <a:r>
+              <a:rPr lang="en-CA" dirty="0"/>
+              <a:t>) = </a:t>
+            </a:r>
+            <a:r>
+              <a:rPr lang="en-CA" dirty="0" err="1" smtClean="0"/>
+              <a:t>G_w</a:t>
+            </a:r>
+            <a:r>
+              <a:rPr lang="en-CA" dirty="0" smtClean="0"/>
+              <a:t>(S,S1,t) </a:t>
+            </a:r>
+            <a:r>
+              <a:rPr lang="en-CA" dirty="0"/>
+              <a:t>+ </a:t>
+            </a:r>
+            <a:r>
+              <a:rPr lang="en-CA" dirty="0" err="1" smtClean="0"/>
+              <a:t>G_b</a:t>
+            </a:r>
+            <a:r>
+              <a:rPr lang="en-CA" dirty="0" smtClean="0"/>
+              <a:t>(S1,D1,t) </a:t>
+            </a:r>
+            <a:r>
+              <a:rPr lang="en-CA" dirty="0"/>
+              <a:t>+ </a:t>
+            </a:r>
+            <a:r>
+              <a:rPr lang="en-CA" dirty="0" err="1" smtClean="0"/>
+              <a:t>G_w</a:t>
+            </a:r>
+            <a:r>
+              <a:rPr lang="en-CA" dirty="0" smtClean="0"/>
+              <a:t>(D1,D,t)</a:t>
+            </a:r>
+          </a:p>
+          <a:p>
+            <a:pPr marL="0" indent="0">
+              <a:buNone/>
+            </a:pPr>
+            <a:r>
+              <a:rPr lang="en-CA" b="1" dirty="0" smtClean="0"/>
+              <a:t>This cost could be associated with confidence level when combined with historical data over the last P observations (from current time) in the period from [t-W/2, T+W/2]</a:t>
+            </a:r>
+          </a:p>
+          <a:p>
+            <a:pPr>
+              <a:buFont typeface="Arial" panose="020B0604020202020204" pitchFamily="34" charset="0"/>
+              <a:buChar char="•"/>
+            </a:pPr>
+            <a:r>
+              <a:rPr lang="en-CA" dirty="0"/>
+              <a:t> </a:t>
+            </a:r>
+            <a:r>
+              <a:rPr lang="en-CA" dirty="0" smtClean="0"/>
+              <a:t>Confidence(s1,t)&gt;Confidence(s2,t) if </a:t>
+            </a:r>
+            <a:r>
+              <a:rPr lang="en-CA" dirty="0" err="1" smtClean="0"/>
+              <a:t>AvailableBikes</a:t>
+            </a:r>
+            <a:r>
+              <a:rPr lang="en-CA" dirty="0" smtClean="0"/>
+              <a:t>(s1,t)&gt;</a:t>
+            </a:r>
+            <a:r>
+              <a:rPr lang="en-CA" dirty="0" err="1" smtClean="0"/>
+              <a:t>AvailableBikes</a:t>
+            </a:r>
+            <a:r>
+              <a:rPr lang="en-CA" dirty="0" smtClean="0"/>
+              <a:t>(s2,t)</a:t>
+            </a:r>
+          </a:p>
+          <a:p>
+            <a:pPr>
+              <a:buFont typeface="Arial" panose="020B0604020202020204" pitchFamily="34" charset="0"/>
+              <a:buChar char="•"/>
+            </a:pPr>
+            <a:r>
+              <a:rPr lang="en-CA" dirty="0" smtClean="0"/>
+              <a:t> Confidence(s1,t</a:t>
+            </a:r>
+            <a:r>
+              <a:rPr lang="en-CA" dirty="0"/>
+              <a:t>)&gt;Confidence(s2,t) if </a:t>
+            </a:r>
+            <a:r>
+              <a:rPr lang="en-CA" dirty="0" err="1" smtClean="0"/>
+              <a:t>AvailableBikesAvg</a:t>
+            </a:r>
+            <a:r>
+              <a:rPr lang="en-CA" dirty="0" smtClean="0"/>
+              <a:t>(s1,t,P,W)&gt;</a:t>
+            </a:r>
+            <a:r>
+              <a:rPr lang="en-CA" dirty="0" err="1" smtClean="0"/>
+              <a:t>AvailableBikesAvg</a:t>
+            </a:r>
+            <a:r>
+              <a:rPr lang="en-CA" dirty="0" smtClean="0"/>
+              <a:t>(s2,t,P,W)</a:t>
+            </a:r>
+            <a:endParaRPr lang="en-CA" dirty="0"/>
+          </a:p>
+          <a:p>
+            <a:pPr>
+              <a:buFont typeface="Arial" panose="020B0604020202020204" pitchFamily="34" charset="0"/>
+              <a:buChar char="•"/>
+            </a:pPr>
+            <a:r>
+              <a:rPr lang="en-CA" dirty="0" smtClean="0"/>
+              <a:t> Confidence(d1,t</a:t>
+            </a:r>
+            <a:r>
+              <a:rPr lang="en-CA" dirty="0"/>
+              <a:t>)&gt;</a:t>
+            </a:r>
+            <a:r>
+              <a:rPr lang="en-CA" dirty="0" smtClean="0"/>
+              <a:t>Confidence(d2,t</a:t>
+            </a:r>
+            <a:r>
+              <a:rPr lang="en-CA" dirty="0"/>
+              <a:t>) if </a:t>
+            </a:r>
+            <a:r>
+              <a:rPr lang="en-CA" dirty="0" err="1" smtClean="0"/>
+              <a:t>AvailableDocks</a:t>
+            </a:r>
+            <a:r>
+              <a:rPr lang="en-CA" dirty="0" smtClean="0"/>
+              <a:t>(d1,t</a:t>
+            </a:r>
+            <a:r>
+              <a:rPr lang="en-CA" dirty="0"/>
+              <a:t>)&gt;</a:t>
+            </a:r>
+            <a:r>
+              <a:rPr lang="en-CA" dirty="0" err="1" smtClean="0"/>
+              <a:t>AvailableDocks</a:t>
+            </a:r>
+            <a:r>
+              <a:rPr lang="en-CA" dirty="0" smtClean="0"/>
+              <a:t>(d2,t</a:t>
+            </a:r>
+            <a:r>
+              <a:rPr lang="en-CA" dirty="0"/>
+              <a:t>)</a:t>
+            </a:r>
+          </a:p>
+          <a:p>
+            <a:pPr>
+              <a:buFont typeface="Arial" panose="020B0604020202020204" pitchFamily="34" charset="0"/>
+              <a:buChar char="•"/>
+            </a:pPr>
+            <a:r>
+              <a:rPr lang="en-CA" dirty="0"/>
+              <a:t> </a:t>
+            </a:r>
+            <a:r>
+              <a:rPr lang="en-CA" dirty="0" smtClean="0"/>
+              <a:t>Confidence(d1,t</a:t>
+            </a:r>
+            <a:r>
+              <a:rPr lang="en-CA" dirty="0"/>
+              <a:t>)&gt;</a:t>
+            </a:r>
+            <a:r>
+              <a:rPr lang="en-CA" dirty="0" smtClean="0"/>
+              <a:t>Confidence(d2,t</a:t>
+            </a:r>
+            <a:r>
+              <a:rPr lang="en-CA" dirty="0"/>
+              <a:t>) if </a:t>
+            </a:r>
+            <a:r>
+              <a:rPr lang="en-CA" dirty="0" err="1" smtClean="0"/>
+              <a:t>AvailableDocksAvg</a:t>
+            </a:r>
+            <a:r>
+              <a:rPr lang="en-CA" dirty="0" smtClean="0"/>
+              <a:t>(d1,t,P,W</a:t>
+            </a:r>
+            <a:r>
+              <a:rPr lang="en-CA" dirty="0"/>
+              <a:t>)&gt;</a:t>
+            </a:r>
+            <a:r>
+              <a:rPr lang="en-CA" dirty="0" err="1" smtClean="0"/>
+              <a:t>AvailableDocksAvg</a:t>
+            </a:r>
+            <a:r>
+              <a:rPr lang="en-CA" dirty="0" smtClean="0"/>
+              <a:t>(d2,t,P,W</a:t>
+            </a:r>
+            <a:r>
+              <a:rPr lang="en-CA" dirty="0"/>
+              <a:t>)</a:t>
+            </a:r>
+          </a:p>
+          <a:p>
+            <a:pPr marL="0" indent="0">
+              <a:buNone/>
+            </a:pPr>
+            <a:endParaRPr lang="en-CA" dirty="0"/>
+          </a:p>
+          <a:p>
+            <a:endParaRPr lang="en-CA" dirty="0"/>
+          </a:p>
+        </p:txBody>
+      </p:sp>
+    </p:spTree>
+    <p:extLst>
+      <p:ext uri="{BB962C8B-B14F-4D97-AF65-F5344CB8AC3E}">
+        <p14:creationId xmlns:p14="http://schemas.microsoft.com/office/powerpoint/2010/main" val="3886950627"/>
+      </p:ext>
+    </p:extLst>
+  </p:cSld>
+  <p:clrMapOvr>
+    <a:masterClrMapping/>
+  </p:clrMapOvr>
+  <p:timing>
+    <p:tnLst>
+      <p:par>
+        <p:cTn id="1" dur="indefinite" restart="never" nodeType="tmRoot"/>
+      </p:par>
+    </p:tnLst>
+  </p:timing>
+</p:sld>
+</file>
+
+<file path=ppt/slides/slide12.xml><?xml version="1.0" encoding="utf-8"?>
+<p:sld xmlns:a="http://schemas.openxmlformats.org/drawingml/2006/main" xmlns:r="http://schemas.openxmlformats.org/officeDocument/2006/relationships" xmlns:p="http://schemas.openxmlformats.org/presentationml/2006/main">
+  <p:cSld>
+    <p:spTree>
+      <p:nvGrpSpPr>
+        <p:cNvPr id="1" name=""/>
+        <p:cNvGrpSpPr/>
+        <p:nvPr/>
+      </p:nvGrpSpPr>
+      <p:grpSpPr>
+        <a:xfrm>
+          <a:off x="0" y="0"/>
+          <a:ext cx="0" cy="0"/>
+          <a:chOff x="0" y="0"/>
+          <a:chExt cx="0" cy="0"/>
+        </a:xfrm>
+      </p:grpSpPr>
+      <p:sp>
+        <p:nvSpPr>
+          <p:cNvPr id="2" name="Title 1"/>
+          <p:cNvSpPr>
+            <a:spLocks noGrp="1"/>
+          </p:cNvSpPr>
+          <p:nvPr>
+            <p:ph type="title"/>
+          </p:nvPr>
+        </p:nvSpPr>
+        <p:spPr/>
+        <p:txBody>
+          <a:bodyPr/>
+          <a:lstStyle/>
+          <a:p>
+            <a:r>
+              <a:rPr lang="en-CA" dirty="0" smtClean="0"/>
+              <a:t>V1.1: No real-time update/re-routing</a:t>
+            </a:r>
+            <a:endParaRPr lang="en-CA" dirty="0"/>
+          </a:p>
+        </p:txBody>
+      </p:sp>
+      <p:sp>
+        <p:nvSpPr>
+          <p:cNvPr id="3" name="Content Placeholder 2"/>
+          <p:cNvSpPr>
+            <a:spLocks noGrp="1"/>
+          </p:cNvSpPr>
+          <p:nvPr>
+            <p:ph idx="1"/>
+          </p:nvPr>
+        </p:nvSpPr>
+        <p:spPr/>
+        <p:txBody>
+          <a:bodyPr/>
+          <a:lstStyle/>
+          <a:p>
+            <a:pPr marL="457200" indent="-457200">
+              <a:buFont typeface="+mj-lt"/>
+              <a:buAutoNum type="arabicPeriod"/>
+            </a:pPr>
+            <a:r>
+              <a:rPr lang="en-CA" dirty="0" smtClean="0"/>
+              <a:t>Read(S,D)</a:t>
+            </a:r>
+          </a:p>
+          <a:p>
+            <a:pPr marL="457200" indent="-457200">
+              <a:buFont typeface="+mj-lt"/>
+              <a:buAutoNum type="arabicPeriod"/>
+            </a:pPr>
+            <a:r>
+              <a:rPr lang="en-CA" dirty="0" smtClean="0"/>
+              <a:t>Calculate </a:t>
+            </a:r>
+            <a:r>
+              <a:rPr lang="en-CA" dirty="0"/>
+              <a:t>C_PUB(</a:t>
+            </a:r>
+            <a:r>
+              <a:rPr lang="en-CA" dirty="0" err="1"/>
+              <a:t>S,D,t</a:t>
+            </a:r>
+            <a:r>
+              <a:rPr lang="en-CA" dirty="0" smtClean="0"/>
+              <a:t>)</a:t>
+            </a:r>
+          </a:p>
+          <a:p>
+            <a:pPr marL="457200" indent="-457200">
+              <a:buFont typeface="+mj-lt"/>
+              <a:buAutoNum type="arabicPeriod"/>
+            </a:pPr>
+            <a:r>
+              <a:rPr lang="en-CA" dirty="0" smtClean="0"/>
+              <a:t>Calculate </a:t>
+            </a:r>
+            <a:r>
+              <a:rPr lang="en-CA" dirty="0"/>
+              <a:t>C_BIXI(</a:t>
+            </a:r>
+            <a:r>
+              <a:rPr lang="en-CA" dirty="0" err="1"/>
+              <a:t>S,D,t</a:t>
+            </a:r>
+            <a:r>
+              <a:rPr lang="en-CA" dirty="0" smtClean="0"/>
+              <a:t>)</a:t>
+            </a:r>
+          </a:p>
+          <a:p>
+            <a:pPr marL="457200" indent="-457200">
+              <a:buFont typeface="+mj-lt"/>
+              <a:buAutoNum type="arabicPeriod"/>
+            </a:pPr>
+            <a:r>
+              <a:rPr lang="en-CA" dirty="0" smtClean="0"/>
+              <a:t>Select route</a:t>
+            </a:r>
+          </a:p>
+          <a:p>
+            <a:pPr marL="457200" indent="-457200">
+              <a:buFont typeface="+mj-lt"/>
+              <a:buAutoNum type="arabicPeriod"/>
+            </a:pPr>
+            <a:r>
+              <a:rPr lang="en-CA" dirty="0" smtClean="0"/>
+              <a:t>Display decision and map  </a:t>
+            </a:r>
+            <a:endParaRPr lang="en-CA" dirty="0"/>
+          </a:p>
+          <a:p>
+            <a:pPr marL="0" indent="0">
+              <a:buNone/>
+            </a:pPr>
+            <a:endParaRPr lang="en-CA" dirty="0"/>
+          </a:p>
+          <a:p>
+            <a:endParaRPr lang="en-CA" dirty="0"/>
+          </a:p>
+        </p:txBody>
+      </p:sp>
+    </p:spTree>
+    <p:extLst>
+      <p:ext uri="{BB962C8B-B14F-4D97-AF65-F5344CB8AC3E}">
+        <p14:creationId xmlns:p14="http://schemas.microsoft.com/office/powerpoint/2010/main" val="4248212465"/>
+      </p:ext>
+    </p:extLst>
+  </p:cSld>
+  <p:clrMapOvr>
+    <a:masterClrMapping/>
+  </p:clrMapOvr>
+  <p:timing>
+    <p:tnLst>
+      <p:par>
+        <p:cTn id="1" dur="indefinite" restart="never" nodeType="tmRoot"/>
+      </p:par>
+    </p:tnLst>
+  </p:timing>
+</p:sld>
+</file>
+
+<file path=ppt/slides/slide13.xml><?xml version="1.0" encoding="utf-8"?>
+<p:sld xmlns:a="http://schemas.openxmlformats.org/drawingml/2006/main" xmlns:r="http://schemas.openxmlformats.org/officeDocument/2006/relationships" xmlns:p="http://schemas.openxmlformats.org/presentationml/2006/main">
+  <p:cSld>
+    <p:spTree>
+      <p:nvGrpSpPr>
+        <p:cNvPr id="1" name=""/>
+        <p:cNvGrpSpPr/>
+        <p:nvPr/>
+      </p:nvGrpSpPr>
+      <p:grpSpPr>
+        <a:xfrm>
+          <a:off x="0" y="0"/>
+          <a:ext cx="0" cy="0"/>
+          <a:chOff x="0" y="0"/>
+          <a:chExt cx="0" cy="0"/>
+        </a:xfrm>
+      </p:grpSpPr>
+      <p:sp>
+        <p:nvSpPr>
+          <p:cNvPr id="2" name="Title 1"/>
+          <p:cNvSpPr>
+            <a:spLocks noGrp="1"/>
+          </p:cNvSpPr>
+          <p:nvPr>
+            <p:ph type="title"/>
+          </p:nvPr>
+        </p:nvSpPr>
+        <p:spPr/>
+        <p:txBody>
+          <a:bodyPr/>
+          <a:lstStyle/>
+          <a:p>
+            <a:r>
+              <a:rPr lang="en-CA" dirty="0" smtClean="0"/>
+              <a:t>V2.1: Real-time updates + re-routings</a:t>
+            </a:r>
+            <a:endParaRPr lang="en-CA" dirty="0"/>
+          </a:p>
+        </p:txBody>
+      </p:sp>
+      <p:sp>
+        <p:nvSpPr>
+          <p:cNvPr id="3" name="Content Placeholder 2"/>
+          <p:cNvSpPr>
+            <a:spLocks noGrp="1"/>
+          </p:cNvSpPr>
+          <p:nvPr>
+            <p:ph idx="1"/>
+          </p:nvPr>
+        </p:nvSpPr>
+        <p:spPr/>
+        <p:txBody>
+          <a:bodyPr>
+            <a:normAutofit fontScale="85000" lnSpcReduction="20000"/>
+          </a:bodyPr>
+          <a:lstStyle/>
+          <a:p>
+            <a:pPr marL="457200" indent="-457200">
+              <a:buFont typeface="+mj-lt"/>
+              <a:buAutoNum type="arabicPeriod"/>
+            </a:pPr>
+            <a:r>
+              <a:rPr lang="en-CA" dirty="0" smtClean="0"/>
+              <a:t>Read(S,D)</a:t>
+            </a:r>
+          </a:p>
+          <a:p>
+            <a:pPr marL="457200" indent="-457200">
+              <a:buFont typeface="+mj-lt"/>
+              <a:buAutoNum type="arabicPeriod"/>
+            </a:pPr>
+            <a:r>
+              <a:rPr lang="en-CA" dirty="0" smtClean="0"/>
+              <a:t>Calculate </a:t>
+            </a:r>
+            <a:r>
+              <a:rPr lang="en-CA" dirty="0"/>
+              <a:t>C_PUB(</a:t>
+            </a:r>
+            <a:r>
+              <a:rPr lang="en-CA" dirty="0" err="1"/>
+              <a:t>S,D,t</a:t>
+            </a:r>
+            <a:r>
+              <a:rPr lang="en-CA" dirty="0" smtClean="0"/>
+              <a:t>)</a:t>
+            </a:r>
+          </a:p>
+          <a:p>
+            <a:pPr marL="457200" indent="-457200">
+              <a:buFont typeface="+mj-lt"/>
+              <a:buAutoNum type="arabicPeriod"/>
+            </a:pPr>
+            <a:r>
+              <a:rPr lang="en-CA" dirty="0" smtClean="0"/>
+              <a:t>Calculate </a:t>
+            </a:r>
+            <a:r>
+              <a:rPr lang="en-CA" dirty="0"/>
+              <a:t>C_BIXI(</a:t>
+            </a:r>
+            <a:r>
+              <a:rPr lang="en-CA" dirty="0" err="1"/>
+              <a:t>S,D,t</a:t>
+            </a:r>
+            <a:r>
+              <a:rPr lang="en-CA" dirty="0" smtClean="0"/>
+              <a:t>)</a:t>
+            </a:r>
+          </a:p>
+          <a:p>
+            <a:pPr marL="457200" indent="-457200">
+              <a:buFont typeface="+mj-lt"/>
+              <a:buAutoNum type="arabicPeriod"/>
+            </a:pPr>
+            <a:r>
+              <a:rPr lang="en-CA" dirty="0" smtClean="0"/>
+              <a:t>Select route</a:t>
+            </a:r>
+          </a:p>
+          <a:p>
+            <a:pPr marL="457200" indent="-457200">
+              <a:buFont typeface="+mj-lt"/>
+              <a:buAutoNum type="arabicPeriod"/>
+            </a:pPr>
+            <a:r>
+              <a:rPr lang="en-CA" dirty="0" smtClean="0"/>
+              <a:t>Display decision and map</a:t>
+            </a:r>
+          </a:p>
+          <a:p>
+            <a:pPr marL="0" indent="0">
+              <a:buNone/>
+            </a:pPr>
+            <a:r>
+              <a:rPr lang="en-CA" b="1" dirty="0" smtClean="0"/>
+              <a:t>If decision == BIXI</a:t>
+            </a:r>
+          </a:p>
+          <a:p>
+            <a:pPr marL="0" indent="0">
+              <a:buNone/>
+            </a:pPr>
+            <a:r>
+              <a:rPr lang="en-CA" dirty="0" smtClean="0"/>
+              <a:t>Every 5 minutes (or upon related information updated): </a:t>
+            </a:r>
+            <a:r>
+              <a:rPr lang="en-CA" dirty="0"/>
+              <a:t>if </a:t>
+            </a:r>
+            <a:r>
+              <a:rPr lang="en-CA" dirty="0" err="1"/>
+              <a:t>AvailableBikes</a:t>
+            </a:r>
+            <a:r>
+              <a:rPr lang="en-CA" dirty="0"/>
+              <a:t>(S1,t)==0 </a:t>
+            </a:r>
+            <a:r>
+              <a:rPr lang="en-CA" dirty="0" smtClean="0"/>
+              <a:t> or </a:t>
+            </a:r>
+            <a:r>
+              <a:rPr lang="en-CA" dirty="0" err="1" smtClean="0"/>
+              <a:t>AvailableDocks</a:t>
+            </a:r>
+            <a:r>
+              <a:rPr lang="en-CA" dirty="0" smtClean="0"/>
+              <a:t>(D1,t</a:t>
+            </a:r>
+            <a:r>
+              <a:rPr lang="en-CA" dirty="0"/>
+              <a:t>)==0</a:t>
+            </a:r>
+            <a:endParaRPr lang="en-CA" dirty="0" smtClean="0"/>
+          </a:p>
+          <a:p>
+            <a:pPr>
+              <a:buFont typeface="Wingdings" panose="05000000000000000000" pitchFamily="2" charset="2"/>
+              <a:buChar char="§"/>
+            </a:pPr>
+            <a:r>
+              <a:rPr lang="en-CA" dirty="0"/>
+              <a:t> </a:t>
+            </a:r>
+            <a:r>
+              <a:rPr lang="en-CA" dirty="0" smtClean="0"/>
+              <a:t>if currently in SEG1</a:t>
+            </a:r>
+          </a:p>
+          <a:p>
+            <a:pPr lvl="1">
+              <a:buFont typeface="Wingdings" panose="05000000000000000000" pitchFamily="2" charset="2"/>
+              <a:buChar char="§"/>
+            </a:pPr>
+            <a:r>
+              <a:rPr lang="en-CA" dirty="0"/>
+              <a:t> </a:t>
+            </a:r>
+            <a:r>
+              <a:rPr lang="en-CA" dirty="0" smtClean="0"/>
+              <a:t>if </a:t>
+            </a:r>
+            <a:r>
+              <a:rPr lang="en-CA" dirty="0" err="1" smtClean="0"/>
+              <a:t>AvailableBikes</a:t>
+            </a:r>
+            <a:r>
+              <a:rPr lang="en-CA" dirty="0" smtClean="0"/>
+              <a:t>(S1,t)==0 </a:t>
+            </a:r>
+          </a:p>
+          <a:p>
+            <a:pPr lvl="1">
+              <a:buFont typeface="Wingdings" panose="05000000000000000000" pitchFamily="2" charset="2"/>
+              <a:buChar char="§"/>
+            </a:pPr>
+            <a:r>
+              <a:rPr lang="en-CA" dirty="0"/>
+              <a:t> </a:t>
+            </a:r>
+            <a:r>
+              <a:rPr lang="en-CA" dirty="0" smtClean="0"/>
+              <a:t>if </a:t>
+            </a:r>
+            <a:r>
+              <a:rPr lang="en-CA" dirty="0" err="1" smtClean="0"/>
+              <a:t>AvailableDocks</a:t>
+            </a:r>
+            <a:r>
+              <a:rPr lang="en-CA" dirty="0" smtClean="0"/>
+              <a:t>(D1,t</a:t>
+            </a:r>
+            <a:r>
+              <a:rPr lang="en-CA" dirty="0"/>
+              <a:t>)==</a:t>
+            </a:r>
+            <a:r>
+              <a:rPr lang="en-CA" dirty="0" smtClean="0"/>
+              <a:t>0</a:t>
+            </a:r>
+          </a:p>
+          <a:p>
+            <a:pPr>
+              <a:buFont typeface="Wingdings" panose="05000000000000000000" pitchFamily="2" charset="2"/>
+              <a:buChar char="§"/>
+            </a:pPr>
+            <a:r>
+              <a:rPr lang="en-CA" dirty="0" smtClean="0"/>
+              <a:t> </a:t>
+            </a:r>
+            <a:r>
+              <a:rPr lang="en-CA" dirty="0"/>
+              <a:t>if currently in </a:t>
+            </a:r>
+            <a:r>
+              <a:rPr lang="en-CA" dirty="0" smtClean="0"/>
+              <a:t>SEG2</a:t>
+            </a:r>
+          </a:p>
+          <a:p>
+            <a:pPr lvl="1">
+              <a:buFont typeface="Wingdings" panose="05000000000000000000" pitchFamily="2" charset="2"/>
+              <a:buChar char="§"/>
+            </a:pPr>
+            <a:r>
+              <a:rPr lang="en-CA" dirty="0"/>
+              <a:t>if </a:t>
+            </a:r>
+            <a:r>
+              <a:rPr lang="en-CA" dirty="0" err="1" smtClean="0"/>
+              <a:t>AvailableDocks</a:t>
+            </a:r>
+            <a:r>
+              <a:rPr lang="en-CA" dirty="0" smtClean="0"/>
+              <a:t>(D1,t</a:t>
+            </a:r>
+            <a:r>
+              <a:rPr lang="en-CA" dirty="0"/>
+              <a:t>)==0</a:t>
+            </a:r>
+            <a:endParaRPr lang="en-CA" dirty="0" smtClean="0"/>
+          </a:p>
+          <a:p>
+            <a:pPr>
+              <a:buFont typeface="Wingdings" panose="05000000000000000000" pitchFamily="2" charset="2"/>
+              <a:buChar char="§"/>
+            </a:pPr>
+            <a:endParaRPr lang="en-CA" dirty="0" smtClean="0"/>
+          </a:p>
+          <a:p>
+            <a:pPr marL="457200" indent="-457200">
+              <a:buFont typeface="+mj-lt"/>
+              <a:buAutoNum type="arabicPeriod"/>
+            </a:pPr>
+            <a:endParaRPr lang="en-CA" dirty="0"/>
+          </a:p>
+          <a:p>
+            <a:endParaRPr lang="en-CA" dirty="0"/>
+          </a:p>
+        </p:txBody>
+      </p:sp>
+    </p:spTree>
+    <p:extLst>
+      <p:ext uri="{BB962C8B-B14F-4D97-AF65-F5344CB8AC3E}">
+        <p14:creationId xmlns:p14="http://schemas.microsoft.com/office/powerpoint/2010/main" val="1280183590"/>
+      </p:ext>
+    </p:extLst>
+  </p:cSld>
+  <p:clrMapOvr>
+    <a:masterClrMapping/>
+  </p:clrMapOvr>
+  <p:timing>
+    <p:tnLst>
+      <p:par>
+        <p:cTn id="1" dur="indefinite" restart="never" nodeType="tmRoot"/>
+      </p:par>
+    </p:tnLst>
+  </p:timing>
+</p:sld>
+</file>
+
 <file path=ppt/slides/slide2.xml><?xml version="1.0" encoding="utf-8"?>
 <p:sld xmlns:a="http://schemas.openxmlformats.org/drawingml/2006/main" xmlns:r="http://schemas.openxmlformats.org/officeDocument/2006/relationships" xmlns:p="http://schemas.openxmlformats.org/presentationml/2006/main">
   <p:cSld>
@@ -4214,7 +5268,7 @@
           <a:bodyPr/>
           <a:lstStyle/>
           <a:p>
-            <a:endParaRPr lang="en-CA"/>
+            <a:endParaRPr lang="en-CA" dirty="0"/>
           </a:p>
         </p:txBody>
       </p:sp>
@@ -4332,7 +5386,7 @@
             </a:pPr>
             <a:r>
               <a:rPr lang="en-CA" dirty="0" smtClean="0"/>
-              <a:t>How to demo the application: perform tests in advance, summarize, visualize the results for presentations</a:t>
+              <a:t>How to demo the application: perform tests in advance, summarize, visualize the results for presentations, live demo?</a:t>
             </a:r>
           </a:p>
           <a:p>
@@ -4392,10 +5446,10 @@
           <a:lstStyle/>
           <a:p>
             <a:r>
-              <a:rPr lang="en-CA" dirty="0" smtClean="0"/>
-              <a:t>Design</a:t>
-            </a:r>
-            <a:endParaRPr lang="en-CA" dirty="0"/>
+              <a:rPr lang="en-CA" sz="6600" b="1" dirty="0" smtClean="0"/>
+              <a:t>Designs and milestones</a:t>
+            </a:r>
+            <a:endParaRPr lang="en-CA" b="1" dirty="0"/>
           </a:p>
         </p:txBody>
       </p:sp>
@@ -4414,101 +5468,27 @@
           <a:bodyPr/>
           <a:lstStyle/>
           <a:p>
-            <a:r>
-              <a:rPr lang="en-CA" b="1" dirty="0" smtClean="0"/>
-              <a:t>Route planning for bus:</a:t>
-            </a:r>
-          </a:p>
-          <a:p>
-            <a:r>
-              <a:rPr lang="en-CA" dirty="0"/>
-              <a:t>- Current location to the best </a:t>
-            </a:r>
-            <a:r>
-              <a:rPr lang="en-CA" dirty="0" smtClean="0"/>
-              <a:t>departure bus station: </a:t>
-            </a:r>
-            <a:r>
-              <a:rPr lang="en-CA" dirty="0"/>
-              <a:t>walk from S to S1</a:t>
-            </a:r>
-          </a:p>
-          <a:p>
-            <a:r>
-              <a:rPr lang="en-CA" dirty="0"/>
-              <a:t>- </a:t>
-            </a:r>
-            <a:r>
-              <a:rPr lang="en-CA" dirty="0" smtClean="0"/>
-              <a:t>Departure bus station </a:t>
-            </a:r>
-            <a:r>
-              <a:rPr lang="en-CA" dirty="0"/>
-              <a:t>S1 to </a:t>
-            </a:r>
-            <a:r>
-              <a:rPr lang="en-CA" dirty="0" smtClean="0"/>
-              <a:t>destination bus station: on the bus from </a:t>
-            </a:r>
-            <a:r>
-              <a:rPr lang="en-CA" dirty="0"/>
-              <a:t>S1 to D1</a:t>
-            </a:r>
-          </a:p>
-          <a:p>
-            <a:r>
-              <a:rPr lang="en-CA" dirty="0"/>
-              <a:t>- </a:t>
-            </a:r>
-            <a:r>
-              <a:rPr lang="en-CA" dirty="0" smtClean="0"/>
-              <a:t>Destination bus station </a:t>
-            </a:r>
-            <a:r>
-              <a:rPr lang="en-CA" dirty="0"/>
-              <a:t>D1 to final destination: walk from D1 to D</a:t>
-            </a:r>
-          </a:p>
-          <a:p>
-            <a:endParaRPr lang="en-CA" dirty="0" smtClean="0"/>
-          </a:p>
-          <a:p>
-            <a:r>
-              <a:rPr lang="en-CA" b="1" dirty="0" smtClean="0"/>
-              <a:t>Route planning for biking:</a:t>
-            </a:r>
-          </a:p>
-          <a:p>
-            <a:r>
-              <a:rPr lang="en-CA" dirty="0" smtClean="0"/>
-              <a:t>- Current location to the best departure BIXI station to pickup a bike: walk from S to S1</a:t>
-            </a:r>
-          </a:p>
-          <a:p>
-            <a:r>
-              <a:rPr lang="en-CA" dirty="0" smtClean="0"/>
-              <a:t>- Departure BIXI station to destination BIXI station: bike from S1 to D1</a:t>
-            </a:r>
-          </a:p>
-          <a:p>
-            <a:r>
-              <a:rPr lang="en-CA" dirty="0" smtClean="0"/>
-              <a:t>- Destination BIXI station to the final destination: walk from D1 to D</a:t>
-            </a:r>
-            <a:endParaRPr lang="en-CA" dirty="0"/>
+            <a:endParaRPr lang="en-CA"/>
           </a:p>
         </p:txBody>
       </p:sp>
     </p:spTree>
     <p:extLst>
       <p:ext uri="{BB962C8B-B14F-4D97-AF65-F5344CB8AC3E}">
-        <p14:creationId xmlns:p14="http://schemas.microsoft.com/office/powerpoint/2010/main" val="863555795"/>
+        <p14:creationId xmlns:p14="http://schemas.microsoft.com/office/powerpoint/2010/main" val="2441757737"/>
       </p:ext>
     </p:extLst>
   </p:cSld>
   <p:clrMapOvr>
     <a:masterClrMapping/>
   </p:clrMapOvr>
+  <p:timing>
+    <p:tnLst>
+      <p:par>
+        <p:cTn id="1" dur="indefinite" restart="never" nodeType="tmRoot"/>
+      </p:par>
+    </p:tnLst>
+  </p:timing>
 </p:sld>
 </file>
 
@@ -4544,7 +5524,11 @@
           <a:bodyPr/>
           <a:lstStyle/>
           <a:p>
-            <a:endParaRPr lang="en-CA"/>
+            <a:r>
+              <a:rPr lang="en-CA" dirty="0" smtClean="0"/>
+              <a:t>Design</a:t>
+            </a:r>
+            <a:endParaRPr lang="en-CA" dirty="0"/>
           </a:p>
         </p:txBody>
       </p:sp>
@@ -4560,38 +5544,111 @@
         </p:nvSpPr>
         <p:spPr/>
         <p:txBody>
-          <a:bodyPr/>
+          <a:bodyPr>
+            <a:normAutofit fontScale="92500" lnSpcReduction="10000"/>
+          </a:bodyPr>
           <a:lstStyle/>
           <a:p>
             <a:pPr marL="0" indent="0">
               <a:buNone/>
             </a:pPr>
             <a:r>
+              <a:rPr lang="en-CA" dirty="0" smtClean="0"/>
+              <a:t>S:</a:t>
+            </a:r>
+            <a:r>
+              <a:rPr lang="en-CA" b="1" dirty="0" smtClean="0"/>
+              <a:t> </a:t>
+            </a:r>
+            <a:r>
+              <a:rPr lang="en-CA" dirty="0" smtClean="0"/>
+              <a:t>original departure point</a:t>
+            </a:r>
+          </a:p>
+          <a:p>
+            <a:pPr marL="0" indent="0">
+              <a:buNone/>
+            </a:pPr>
+            <a:r>
+              <a:rPr lang="en-CA" dirty="0" smtClean="0"/>
+              <a:t>D: final destination</a:t>
+            </a:r>
+          </a:p>
+          <a:p>
+            <a:pPr marL="0" indent="0">
+              <a:buNone/>
+            </a:pPr>
+            <a:r>
+              <a:rPr lang="en-CA" dirty="0" smtClean="0"/>
+              <a:t>S1: </a:t>
+            </a:r>
+            <a:r>
               <a:rPr lang="en-CA" dirty="0"/>
-              <a:t>Scalability:</a:t>
-            </a:r>
-          </a:p>
-          <a:p>
-            <a:pPr>
-              <a:buFontTx/>
-              <a:buChar char="-"/>
+              <a:t>departure BIXI station </a:t>
+            </a:r>
+            <a:endParaRPr lang="en-CA" dirty="0" smtClean="0"/>
+          </a:p>
+          <a:p>
+            <a:pPr marL="0" indent="0">
+              <a:buNone/>
             </a:pPr>
             <a:r>
               <a:rPr lang="en-CA" dirty="0"/>
-              <a:t>a vast number of users use the APP in peak time</a:t>
-            </a:r>
-          </a:p>
-          <a:p>
-            <a:pPr>
-              <a:buFontTx/>
-              <a:buChar char="-"/>
-            </a:pPr>
+              <a:t>D1: </a:t>
+            </a:r>
+            <a:r>
+              <a:rPr lang="en-CA" dirty="0" smtClean="0"/>
+              <a:t>destination </a:t>
+            </a:r>
             <a:r>
               <a:rPr lang="en-CA" dirty="0"/>
-              <a:t> VMs management</a:t>
-            </a:r>
-          </a:p>
-          <a:p>
+              <a:t>BIXI </a:t>
+            </a:r>
+            <a:r>
+              <a:rPr lang="en-CA" dirty="0" smtClean="0"/>
+              <a:t>station</a:t>
+            </a:r>
+          </a:p>
+          <a:p>
+            <a:r>
+              <a:rPr lang="en-CA" b="1" dirty="0" smtClean="0"/>
+              <a:t>Route planning for biking:</a:t>
+            </a:r>
+          </a:p>
+          <a:p>
+            <a:r>
+              <a:rPr lang="en-CA" dirty="0" smtClean="0"/>
+              <a:t>- SEG1: Current location to the best departure BIXI station to pickup a bike: walk from S to S1</a:t>
+            </a:r>
+          </a:p>
+          <a:p>
+            <a:r>
+              <a:rPr lang="en-CA" dirty="0" smtClean="0"/>
+              <a:t>- SEG2: Departure BIXI station to destination BIXI station: bike from S1 to D1</a:t>
+            </a:r>
+          </a:p>
+          <a:p>
+            <a:r>
+              <a:rPr lang="en-CA" dirty="0" smtClean="0"/>
+              <a:t>- SEG3: Destination BIXI station to the final destination: walk from D1 to D</a:t>
+            </a:r>
+          </a:p>
+          <a:p>
+            <a:endParaRPr lang="en-CA" dirty="0" smtClean="0"/>
+          </a:p>
+          <a:p>
+            <a:r>
+              <a:rPr lang="en-CA" dirty="0" smtClean="0"/>
+              <a:t>S ----------------------&gt; S1</a:t>
+            </a:r>
+            <a:r>
+              <a:rPr lang="en-CA" dirty="0"/>
+              <a:t> </a:t>
+            </a:r>
+            <a:r>
+              <a:rPr lang="en-CA" dirty="0" smtClean="0"/>
+              <a:t>======================&gt; D1 ----------------------&gt; D</a:t>
+            </a:r>
             <a:endParaRPr lang="en-CA" dirty="0"/>
           </a:p>
         </p:txBody>
@@ -4599,13 +5656,619 @@
     </p:spTree>
     <p:extLst>
       <p:ext uri="{BB962C8B-B14F-4D97-AF65-F5344CB8AC3E}">
-        <p14:creationId xmlns:p14="http://schemas.microsoft.com/office/powerpoint/2010/main" val="1614953261"/>
+        <p14:creationId xmlns:p14="http://schemas.microsoft.com/office/powerpoint/2010/main" val="3119394370"/>
       </p:ext>
     </p:extLst>
   </p:cSld>
   <p:clrMapOvr>
     <a:masterClrMapping/>
   </p:clrMapOvr>
+  <p:timing>
+    <p:tnLst>
+      <p:par>
+        <p:cTn id="1" dur="indefinite" restart="never" nodeType="tmRoot"/>
+      </p:par>
+    </p:tnLst>
+  </p:timing>
+</p:sld>
+</file>
+
+<file path=ppt/slides/slide8.xml><?xml version="1.0" encoding="utf-8"?>
+<p:sld xmlns:a="http://schemas.openxmlformats.org/drawingml/2006/main" xmlns:r="http://schemas.openxmlformats.org/officeDocument/2006/relationships" xmlns:p="http://schemas.openxmlformats.org/presentationml/2006/main">
+  <p:cSld>
+    <p:spTree>
+      <p:nvGrpSpPr>
+        <p:cNvPr id="1" name=""/>
+        <p:cNvGrpSpPr/>
+        <p:nvPr/>
+      </p:nvGrpSpPr>
+      <p:grpSpPr>
+        <a:xfrm>
+          <a:off x="0" y="0"/>
+          <a:ext cx="0" cy="0"/>
+          <a:chOff x="0" y="0"/>
+          <a:chExt cx="0" cy="0"/>
+        </a:xfrm>
+      </p:grpSpPr>
+      <p:sp>
+        <p:nvSpPr>
+          <p:cNvPr id="2" name="Title 1"/>
+          <p:cNvSpPr>
+            <a:spLocks noGrp="1"/>
+          </p:cNvSpPr>
+          <p:nvPr>
+            <p:ph type="title"/>
+          </p:nvPr>
+        </p:nvSpPr>
+        <p:spPr/>
+        <p:txBody>
+          <a:bodyPr/>
+          <a:lstStyle/>
+          <a:p>
+            <a:r>
+              <a:rPr lang="en-CA" dirty="0" smtClean="0"/>
+              <a:t>Design</a:t>
+            </a:r>
+            <a:endParaRPr lang="en-CA" dirty="0"/>
+          </a:p>
+        </p:txBody>
+      </p:sp>
+      <p:sp>
+        <p:nvSpPr>
+          <p:cNvPr id="3" name="Content Placeholder 2"/>
+          <p:cNvSpPr>
+            <a:spLocks noGrp="1"/>
+          </p:cNvSpPr>
+          <p:nvPr>
+            <p:ph idx="1"/>
+          </p:nvPr>
+        </p:nvSpPr>
+        <p:spPr>
+          <a:xfrm>
+            <a:off x="1097280" y="1845734"/>
+            <a:ext cx="10058400" cy="4422062"/>
+          </a:xfrm>
+        </p:spPr>
+        <p:txBody>
+          <a:bodyPr>
+            <a:normAutofit/>
+          </a:bodyPr>
+          <a:lstStyle/>
+          <a:p>
+            <a:pPr>
+              <a:buFont typeface="Wingdings" panose="05000000000000000000" pitchFamily="2" charset="2"/>
+              <a:buChar char="§"/>
+            </a:pPr>
+            <a:r>
+              <a:rPr lang="en-CA" b="1" dirty="0" smtClean="0"/>
+              <a:t> B</a:t>
+            </a:r>
+            <a:r>
+              <a:rPr lang="en-CA" dirty="0" smtClean="0"/>
+              <a:t>: set of all bike stations</a:t>
+            </a:r>
+          </a:p>
+          <a:p>
+            <a:pPr lvl="1">
+              <a:buFont typeface="Wingdings" panose="05000000000000000000" pitchFamily="2" charset="2"/>
+              <a:buChar char="§"/>
+            </a:pPr>
+            <a:r>
+              <a:rPr lang="en-CA" dirty="0"/>
+              <a:t>  </a:t>
+            </a:r>
+            <a:r>
+              <a:rPr lang="en-CA" dirty="0" err="1"/>
+              <a:t>AvailableBikes</a:t>
+            </a:r>
+            <a:r>
+              <a:rPr lang="en-CA" dirty="0"/>
+              <a:t>(</a:t>
+            </a:r>
+            <a:r>
+              <a:rPr lang="en-CA" dirty="0" err="1"/>
+              <a:t>s,t</a:t>
+            </a:r>
+            <a:r>
+              <a:rPr lang="en-CA" dirty="0"/>
+              <a:t>): the number of available bikes at station s at time t</a:t>
+            </a:r>
+          </a:p>
+          <a:p>
+            <a:pPr lvl="1">
+              <a:buFont typeface="Wingdings" panose="05000000000000000000" pitchFamily="2" charset="2"/>
+              <a:buChar char="§"/>
+            </a:pPr>
+            <a:r>
+              <a:rPr lang="en-CA" dirty="0"/>
+              <a:t> </a:t>
+            </a:r>
+            <a:r>
+              <a:rPr lang="en-CA" dirty="0" err="1"/>
+              <a:t>AvailableDocks</a:t>
+            </a:r>
+            <a:r>
+              <a:rPr lang="en-CA" dirty="0"/>
+              <a:t>(</a:t>
+            </a:r>
+            <a:r>
+              <a:rPr lang="en-CA" dirty="0" err="1"/>
+              <a:t>s,t</a:t>
+            </a:r>
+            <a:r>
+              <a:rPr lang="en-CA" dirty="0"/>
+              <a:t>): the number of available docks at station s at time t</a:t>
+            </a:r>
+          </a:p>
+          <a:p>
+            <a:pPr>
+              <a:buFont typeface="Wingdings" panose="05000000000000000000" pitchFamily="2" charset="2"/>
+              <a:buChar char="§"/>
+            </a:pPr>
+            <a:r>
+              <a:rPr lang="en-CA" b="1" dirty="0" smtClean="0"/>
+              <a:t> B_s</a:t>
+            </a:r>
+            <a:r>
+              <a:rPr lang="en-CA" dirty="0" smtClean="0"/>
+              <a:t>(</a:t>
+            </a:r>
+            <a:r>
+              <a:rPr lang="en-CA" dirty="0" err="1" smtClean="0"/>
+              <a:t>S,n,m,t</a:t>
+            </a:r>
+            <a:r>
+              <a:rPr lang="en-CA" dirty="0" smtClean="0"/>
+              <a:t>): </a:t>
+            </a:r>
+            <a:r>
+              <a:rPr lang="en-CA" dirty="0"/>
+              <a:t>set of n</a:t>
+            </a:r>
+            <a:r>
+              <a:rPr lang="en-CA" dirty="0" smtClean="0"/>
+              <a:t> bike stations that have (</a:t>
+            </a:r>
+            <a:r>
+              <a:rPr lang="en-CA" dirty="0"/>
+              <a:t>a</a:t>
+            </a:r>
+            <a:r>
+              <a:rPr lang="en-CA" dirty="0" smtClean="0"/>
+              <a:t>) </a:t>
+            </a:r>
+            <a:r>
+              <a:rPr lang="en-CA" dirty="0"/>
+              <a:t>shortest geo distances to </a:t>
+            </a:r>
+            <a:r>
+              <a:rPr lang="en-CA" dirty="0" smtClean="0"/>
+              <a:t>S and (b) at least m available bikes at time t</a:t>
+            </a:r>
+            <a:endParaRPr lang="en-CA" dirty="0"/>
+          </a:p>
+          <a:p>
+            <a:pPr>
+              <a:buFont typeface="Wingdings" panose="05000000000000000000" pitchFamily="2" charset="2"/>
+              <a:buChar char="§"/>
+            </a:pPr>
+            <a:r>
+              <a:rPr lang="en-CA" b="1" dirty="0" smtClean="0"/>
+              <a:t> </a:t>
+            </a:r>
+            <a:r>
+              <a:rPr lang="en-CA" b="1" dirty="0" err="1" smtClean="0"/>
+              <a:t>B_d</a:t>
+            </a:r>
+            <a:r>
+              <a:rPr lang="en-CA" dirty="0" smtClean="0"/>
+              <a:t>(</a:t>
+            </a:r>
+            <a:r>
+              <a:rPr lang="en-CA" dirty="0" err="1" smtClean="0"/>
+              <a:t>D,n,m,t</a:t>
+            </a:r>
+            <a:r>
+              <a:rPr lang="en-CA" dirty="0" smtClean="0"/>
+              <a:t>): </a:t>
+            </a:r>
+            <a:r>
+              <a:rPr lang="en-CA" dirty="0"/>
+              <a:t>set of n bike stations </a:t>
+            </a:r>
+            <a:r>
+              <a:rPr lang="en-CA" dirty="0" smtClean="0"/>
+              <a:t>that have (a) </a:t>
+            </a:r>
+            <a:r>
+              <a:rPr lang="en-CA" dirty="0"/>
+              <a:t>shortest geo distances to </a:t>
+            </a:r>
+            <a:r>
+              <a:rPr lang="en-CA" dirty="0" smtClean="0"/>
+              <a:t>D and (b) </a:t>
+            </a:r>
+            <a:r>
+              <a:rPr lang="en-CA" dirty="0"/>
+              <a:t>at least m available </a:t>
+            </a:r>
+            <a:r>
+              <a:rPr lang="en-CA" dirty="0" smtClean="0"/>
+              <a:t>docks at time t</a:t>
+            </a:r>
+          </a:p>
+          <a:p>
+            <a:pPr>
+              <a:buFont typeface="Wingdings" panose="05000000000000000000" pitchFamily="2" charset="2"/>
+              <a:buChar char="§"/>
+            </a:pPr>
+            <a:r>
+              <a:rPr lang="en-CA" dirty="0" smtClean="0"/>
+              <a:t> </a:t>
+            </a:r>
+            <a:r>
+              <a:rPr lang="en-CA" dirty="0" err="1" smtClean="0"/>
+              <a:t>G_w</a:t>
+            </a:r>
+            <a:r>
+              <a:rPr lang="en-CA" dirty="0" smtClean="0"/>
+              <a:t>(X,Y), </a:t>
+            </a:r>
+            <a:r>
+              <a:rPr lang="en-CA" dirty="0" err="1" smtClean="0"/>
+              <a:t>G_b</a:t>
+            </a:r>
+            <a:r>
+              <a:rPr lang="en-CA" dirty="0" smtClean="0"/>
+              <a:t>(X,Y), </a:t>
+            </a:r>
+            <a:r>
+              <a:rPr lang="en-CA" dirty="0" err="1" smtClean="0"/>
+              <a:t>G_pub</a:t>
+            </a:r>
+            <a:r>
+              <a:rPr lang="en-CA" dirty="0" smtClean="0"/>
+              <a:t>(X,Y</a:t>
+            </a:r>
+            <a:r>
+              <a:rPr lang="en-CA" dirty="0"/>
+              <a:t>)</a:t>
+            </a:r>
+            <a:r>
+              <a:rPr lang="en-CA" dirty="0" smtClean="0"/>
+              <a:t>: </a:t>
+            </a:r>
+            <a:r>
+              <a:rPr lang="en-CA" dirty="0"/>
+              <a:t>the cost of </a:t>
+            </a:r>
+            <a:r>
+              <a:rPr lang="en-CA" dirty="0" smtClean="0"/>
+              <a:t>walking/biking/public transportation </a:t>
+            </a:r>
+            <a:r>
+              <a:rPr lang="en-CA" dirty="0"/>
+              <a:t>from X to Y calculated by </a:t>
+            </a:r>
+            <a:r>
+              <a:rPr lang="en-CA" dirty="0" err="1" smtClean="0"/>
+              <a:t>GoogleAPI</a:t>
+            </a:r>
+            <a:r>
+              <a:rPr lang="en-CA" dirty="0" smtClean="0"/>
+              <a:t> at time t</a:t>
+            </a:r>
+          </a:p>
+        </p:txBody>
+      </p:sp>
+    </p:spTree>
+    <p:extLst>
+      <p:ext uri="{BB962C8B-B14F-4D97-AF65-F5344CB8AC3E}">
+        <p14:creationId xmlns:p14="http://schemas.microsoft.com/office/powerpoint/2010/main" val="2256211168"/>
+      </p:ext>
+    </p:extLst>
+  </p:cSld>
+  <p:clrMapOvr>
+    <a:masterClrMapping/>
+  </p:clrMapOvr>
+  <p:timing>
+    <p:tnLst>
+      <p:par>
+        <p:cTn id="1" dur="indefinite" restart="never" nodeType="tmRoot"/>
+      </p:par>
+    </p:tnLst>
+  </p:timing>
+</p:sld>
+</file>
+
+<file path=ppt/slides/slide9.xml><?xml version="1.0" encoding="utf-8"?>
+<p:sld xmlns:a="http://schemas.openxmlformats.org/drawingml/2006/main" xmlns:r="http://schemas.openxmlformats.org/officeDocument/2006/relationships" xmlns:p="http://schemas.openxmlformats.org/presentationml/2006/main">
+  <p:cSld>
+    <p:spTree>
+      <p:nvGrpSpPr>
+        <p:cNvPr id="1" name=""/>
+        <p:cNvGrpSpPr/>
+        <p:nvPr/>
+      </p:nvGrpSpPr>
+      <p:grpSpPr>
+        <a:xfrm>
+          <a:off x="0" y="0"/>
+          <a:ext cx="0" cy="0"/>
+          <a:chOff x="0" y="0"/>
+          <a:chExt cx="0" cy="0"/>
+        </a:xfrm>
+      </p:grpSpPr>
+      <p:sp>
+        <p:nvSpPr>
+          <p:cNvPr id="2" name="Title 1"/>
+          <p:cNvSpPr>
+            <a:spLocks noGrp="1"/>
+          </p:cNvSpPr>
+          <p:nvPr>
+            <p:ph type="title"/>
+          </p:nvPr>
+        </p:nvSpPr>
+        <p:spPr/>
+        <p:txBody>
+          <a:bodyPr/>
+          <a:lstStyle/>
+          <a:p>
+            <a:r>
+              <a:rPr lang="en-CA" dirty="0" smtClean="0"/>
+              <a:t>Design</a:t>
+            </a:r>
+            <a:endParaRPr lang="en-CA" dirty="0"/>
+          </a:p>
+        </p:txBody>
+      </p:sp>
+      <p:sp>
+        <p:nvSpPr>
+          <p:cNvPr id="3" name="Content Placeholder 2"/>
+          <p:cNvSpPr>
+            <a:spLocks noGrp="1"/>
+          </p:cNvSpPr>
+          <p:nvPr>
+            <p:ph idx="1"/>
+          </p:nvPr>
+        </p:nvSpPr>
+        <p:spPr>
+          <a:xfrm>
+            <a:off x="1097280" y="1845734"/>
+            <a:ext cx="10058400" cy="4422062"/>
+          </a:xfrm>
+        </p:spPr>
+        <p:txBody>
+          <a:bodyPr>
+            <a:normAutofit/>
+          </a:bodyPr>
+          <a:lstStyle/>
+          <a:p>
+            <a:pPr marL="0" indent="0">
+              <a:buNone/>
+            </a:pPr>
+            <a:r>
+              <a:rPr lang="en-CA" b="1" dirty="0" smtClean="0"/>
+              <a:t>How to select S1?</a:t>
+            </a:r>
+          </a:p>
+          <a:p>
+            <a:pPr marL="0" indent="0">
+              <a:buNone/>
+            </a:pPr>
+            <a:r>
+              <a:rPr lang="en-CA" dirty="0" smtClean="0"/>
+              <a:t>S1 \in </a:t>
+            </a:r>
+            <a:r>
+              <a:rPr lang="en-CA" b="1" dirty="0"/>
+              <a:t>B_s</a:t>
+            </a:r>
+            <a:r>
+              <a:rPr lang="en-CA" dirty="0"/>
+              <a:t>(</a:t>
+            </a:r>
+            <a:r>
+              <a:rPr lang="en-CA" dirty="0" err="1"/>
+              <a:t>S,n,m,t</a:t>
+            </a:r>
+            <a:r>
+              <a:rPr lang="en-CA" dirty="0" smtClean="0"/>
+              <a:t>) and </a:t>
+            </a:r>
+            <a:r>
+              <a:rPr lang="en-CA" dirty="0" err="1" smtClean="0"/>
+              <a:t>G_w</a:t>
+            </a:r>
+            <a:r>
+              <a:rPr lang="en-CA" dirty="0" smtClean="0"/>
+              <a:t>(S,S1) = min{</a:t>
+            </a:r>
+            <a:r>
+              <a:rPr lang="en-CA" dirty="0" err="1" smtClean="0"/>
+              <a:t>G_w</a:t>
+            </a:r>
+            <a:r>
+              <a:rPr lang="en-CA" dirty="0" smtClean="0"/>
+              <a:t>(S,s)}, \</a:t>
+            </a:r>
+            <a:r>
+              <a:rPr lang="en-CA" dirty="0" err="1" smtClean="0"/>
+              <a:t>forall</a:t>
+            </a:r>
+            <a:r>
+              <a:rPr lang="en-CA" dirty="0" smtClean="0"/>
+              <a:t> s \in </a:t>
+            </a:r>
+            <a:r>
+              <a:rPr lang="en-CA" b="1" dirty="0" smtClean="0"/>
+              <a:t>B_s</a:t>
+            </a:r>
+            <a:r>
+              <a:rPr lang="en-CA" dirty="0" smtClean="0"/>
+              <a:t>(</a:t>
+            </a:r>
+            <a:r>
+              <a:rPr lang="en-CA" dirty="0" err="1" smtClean="0"/>
+              <a:t>S,n,m,t</a:t>
+            </a:r>
+            <a:r>
+              <a:rPr lang="en-CA" dirty="0" smtClean="0"/>
+              <a:t>)</a:t>
+            </a:r>
+          </a:p>
+          <a:p>
+            <a:pPr marL="0" indent="0">
+              <a:buNone/>
+            </a:pPr>
+            <a:r>
+              <a:rPr lang="en-CA" b="1" dirty="0"/>
+              <a:t>How to select </a:t>
+            </a:r>
+            <a:r>
+              <a:rPr lang="en-CA" b="1" dirty="0" smtClean="0"/>
+              <a:t>D1</a:t>
+            </a:r>
+            <a:r>
+              <a:rPr lang="en-CA" b="1" dirty="0"/>
+              <a:t>?</a:t>
+            </a:r>
+          </a:p>
+          <a:p>
+            <a:pPr marL="0" indent="0">
+              <a:buNone/>
+            </a:pPr>
+            <a:r>
+              <a:rPr lang="en-CA" dirty="0" smtClean="0"/>
+              <a:t>D1 </a:t>
+            </a:r>
+            <a:r>
+              <a:rPr lang="en-CA" dirty="0"/>
+              <a:t>\in </a:t>
+            </a:r>
+            <a:r>
+              <a:rPr lang="en-CA" b="1" dirty="0" err="1" smtClean="0"/>
+              <a:t>B_d</a:t>
+            </a:r>
+            <a:r>
+              <a:rPr lang="en-CA" dirty="0" smtClean="0"/>
+              <a:t>(</a:t>
+            </a:r>
+            <a:r>
+              <a:rPr lang="en-CA" dirty="0" err="1"/>
+              <a:t>D</a:t>
+            </a:r>
+            <a:r>
+              <a:rPr lang="en-CA" dirty="0" err="1" smtClean="0"/>
+              <a:t>,n,m,t</a:t>
+            </a:r>
+            <a:r>
+              <a:rPr lang="en-CA" dirty="0"/>
+              <a:t>) and </a:t>
+            </a:r>
+            <a:r>
+              <a:rPr lang="en-CA" dirty="0" err="1" smtClean="0"/>
+              <a:t>G_w</a:t>
+            </a:r>
+            <a:r>
+              <a:rPr lang="en-CA" dirty="0" smtClean="0"/>
+              <a:t>(D1,D) </a:t>
+            </a:r>
+            <a:r>
+              <a:rPr lang="en-CA" dirty="0"/>
+              <a:t>= </a:t>
+            </a:r>
+            <a:r>
+              <a:rPr lang="en-CA" dirty="0" smtClean="0"/>
+              <a:t>min{</a:t>
+            </a:r>
+            <a:r>
+              <a:rPr lang="en-CA" dirty="0" err="1" smtClean="0"/>
+              <a:t>G_w</a:t>
+            </a:r>
+            <a:r>
+              <a:rPr lang="en-CA" dirty="0" smtClean="0"/>
+              <a:t>(</a:t>
+            </a:r>
+            <a:r>
+              <a:rPr lang="en-CA" dirty="0" err="1" smtClean="0"/>
+              <a:t>d,D</a:t>
+            </a:r>
+            <a:r>
+              <a:rPr lang="en-CA" dirty="0" smtClean="0"/>
+              <a:t>)}, </a:t>
+            </a:r>
+            <a:r>
+              <a:rPr lang="en-CA" dirty="0"/>
+              <a:t>\</a:t>
+            </a:r>
+            <a:r>
+              <a:rPr lang="en-CA" dirty="0" err="1"/>
+              <a:t>forall</a:t>
+            </a:r>
+            <a:r>
+              <a:rPr lang="en-CA" dirty="0"/>
+              <a:t> </a:t>
+            </a:r>
+            <a:r>
+              <a:rPr lang="en-CA" dirty="0" smtClean="0"/>
+              <a:t>d </a:t>
+            </a:r>
+            <a:r>
+              <a:rPr lang="en-CA" dirty="0"/>
+              <a:t>\in </a:t>
+            </a:r>
+            <a:r>
+              <a:rPr lang="en-CA" b="1" dirty="0" err="1" smtClean="0"/>
+              <a:t>B_d</a:t>
+            </a:r>
+            <a:r>
+              <a:rPr lang="en-CA" dirty="0" smtClean="0"/>
+              <a:t>(</a:t>
+            </a:r>
+            <a:r>
+              <a:rPr lang="en-CA" dirty="0" err="1"/>
+              <a:t>D</a:t>
+            </a:r>
+            <a:r>
+              <a:rPr lang="en-CA" dirty="0" err="1" smtClean="0"/>
+              <a:t>,n,m,t</a:t>
+            </a:r>
+            <a:r>
+              <a:rPr lang="en-CA" dirty="0" smtClean="0"/>
+              <a:t>)</a:t>
+            </a:r>
+          </a:p>
+          <a:p>
+            <a:pPr marL="0" indent="0">
+              <a:buNone/>
+            </a:pPr>
+            <a:endParaRPr lang="en-CA" dirty="0"/>
+          </a:p>
+          <a:p>
+            <a:pPr marL="0" indent="0">
+              <a:buNone/>
+            </a:pPr>
+            <a:endParaRPr lang="en-CA" dirty="0" smtClean="0"/>
+          </a:p>
+        </p:txBody>
+      </p:sp>
+    </p:spTree>
+    <p:extLst>
+      <p:ext uri="{BB962C8B-B14F-4D97-AF65-F5344CB8AC3E}">
+        <p14:creationId xmlns:p14="http://schemas.microsoft.com/office/powerpoint/2010/main" val="2511717434"/>
+      </p:ext>
+    </p:extLst>
+  </p:cSld>
+  <p:clrMapOvr>
+    <a:masterClrMapping/>
+  </p:clrMapOvr>
+  <p:timing>
+    <p:tnLst>
+      <p:par>
+        <p:cTn id="1" dur="indefinite" restart="never" nodeType="tmRoot"/>
+      </p:par>
+    </p:tnLst>
+  </p:timing>
 </p:sld>
 </file>
 

</xml_diff>